<commit_message>
updated ppt and keynote
</commit_message>
<xml_diff>
--- a/blrkotlin-1-8-2020/blrkotlin-1-8-2020.pptx
+++ b/blrkotlin-1-8-2020/blrkotlin-1-8-2020.pptx
@@ -23,6 +23,8 @@
     <p:sldId id="268" r:id="rId20"/>
     <p:sldId id="269" r:id="rId21"/>
     <p:sldId id="270" r:id="rId22"/>
+    <p:sldId id="271" r:id="rId23"/>
+    <p:sldId id="272" r:id="rId24"/>
   </p:sldIdLst>
   <p:sldSz cx="13004800" cy="9753600"/>
   <p:notesSz cx="6858000" cy="9144000"/>
@@ -505,6 +507,803 @@
 </p:notesMaster>
 </file>
 
+<file path=ppt/notesSlides/notesSlide1.xml><?xml version="1.0" encoding="utf-8"?>
+<p:notes xmlns:a="http://schemas.openxmlformats.org/drawingml/2006/main" xmlns:r="http://schemas.openxmlformats.org/officeDocument/2006/relationships" xmlns:p="http://schemas.openxmlformats.org/presentationml/2006/main" showMasterSp="1" showMasterPhAnim="1">
+  <p:cSld>
+    <p:spTree>
+      <p:nvGrpSpPr>
+        <p:cNvPr id="1" name=""/>
+        <p:cNvGrpSpPr/>
+        <p:nvPr/>
+      </p:nvGrpSpPr>
+      <p:grpSpPr>
+        <a:xfrm>
+          <a:off x="0" y="0"/>
+          <a:ext cx="0" cy="0"/>
+          <a:chOff x="0" y="0"/>
+          <a:chExt cx="0" cy="0"/>
+        </a:xfrm>
+      </p:grpSpPr>
+      <p:sp>
+        <p:nvSpPr>
+          <p:cNvPr id="135" name="Shape 135"/>
+          <p:cNvSpPr/>
+          <p:nvPr>
+            <p:ph type="sldImg"/>
+          </p:nvPr>
+        </p:nvSpPr>
+        <p:spPr>
+          <a:prstGeom prst="rect">
+            <a:avLst/>
+          </a:prstGeom>
+        </p:spPr>
+        <p:txBody>
+          <a:bodyPr/>
+          <a:lstStyle/>
+          <a:p>
+            <a:pPr/>
+          </a:p>
+        </p:txBody>
+      </p:sp>
+      <p:sp>
+        <p:nvSpPr>
+          <p:cNvPr id="136" name="Shape 136"/>
+          <p:cNvSpPr/>
+          <p:nvPr>
+            <p:ph type="body" sz="quarter" idx="1"/>
+          </p:nvPr>
+        </p:nvSpPr>
+        <p:spPr>
+          <a:prstGeom prst="rect">
+            <a:avLst/>
+          </a:prstGeom>
+        </p:spPr>
+        <p:txBody>
+          <a:bodyPr/>
+          <a:lstStyle/>
+          <a:p>
+            <a:pPr/>
+            <a:r>
+              <a:t>greetings</a:t>
+            </a:r>
+          </a:p>
+          <a:p>
+            <a:pPr/>
+            <a:r>
+              <a:t>disclaimer going to be focussed on backend tech </a:t>
+            </a:r>
+          </a:p>
+          <a:p>
+            <a:pPr marL="271182" indent="-271182">
+              <a:buClr>
+                <a:srgbClr val="BEBEBE"/>
+              </a:buClr>
+              <a:buSzPct val="125000"/>
+              <a:buChar char="-"/>
+            </a:pPr>
+            <a:r>
+              <a:t>basic and foundational principles that governs a scalable architecture</a:t>
+            </a:r>
+          </a:p>
+          <a:p>
+            <a:pPr marL="271182" indent="-271182">
+              <a:buClr>
+                <a:srgbClr val="BEBEBE"/>
+              </a:buClr>
+              <a:buSzPct val="125000"/>
+              <a:buChar char="-"/>
+            </a:pPr>
+            <a:r>
+              <a:t> how can you leverage open source frameworks to build a  resilient system</a:t>
+            </a:r>
+          </a:p>
+          <a:p>
+            <a:pPr marL="271182" indent="-271182">
+              <a:buClr>
+                <a:srgbClr val="BEBEBE"/>
+              </a:buClr>
+              <a:buSzPct val="125000"/>
+              <a:buChar char="-"/>
+            </a:pPr>
+            <a:r>
+              <a:t>in the end empower you so that you can make a right decision for yourself</a:t>
+            </a:r>
+          </a:p>
+        </p:txBody>
+      </p:sp>
+    </p:spTree>
+  </p:cSld>
+  <p:clrMapOvr>
+    <a:masterClrMapping/>
+  </p:clrMapOvr>
+</p:notes>
+</file>
+
+<file path=ppt/notesSlides/notesSlide2.xml><?xml version="1.0" encoding="utf-8"?>
+<p:notes xmlns:a="http://schemas.openxmlformats.org/drawingml/2006/main" xmlns:r="http://schemas.openxmlformats.org/officeDocument/2006/relationships" xmlns:p="http://schemas.openxmlformats.org/presentationml/2006/main" showMasterSp="1" showMasterPhAnim="1">
+  <p:cSld>
+    <p:spTree>
+      <p:nvGrpSpPr>
+        <p:cNvPr id="1" name=""/>
+        <p:cNvGrpSpPr/>
+        <p:nvPr/>
+      </p:nvGrpSpPr>
+      <p:grpSpPr>
+        <a:xfrm>
+          <a:off x="0" y="0"/>
+          <a:ext cx="0" cy="0"/>
+          <a:chOff x="0" y="0"/>
+          <a:chExt cx="0" cy="0"/>
+        </a:xfrm>
+      </p:grpSpPr>
+      <p:sp>
+        <p:nvSpPr>
+          <p:cNvPr id="142" name="Shape 142"/>
+          <p:cNvSpPr/>
+          <p:nvPr>
+            <p:ph type="sldImg"/>
+          </p:nvPr>
+        </p:nvSpPr>
+        <p:spPr>
+          <a:prstGeom prst="rect">
+            <a:avLst/>
+          </a:prstGeom>
+        </p:spPr>
+        <p:txBody>
+          <a:bodyPr/>
+          <a:lstStyle/>
+          <a:p>
+            <a:pPr/>
+          </a:p>
+        </p:txBody>
+      </p:sp>
+      <p:sp>
+        <p:nvSpPr>
+          <p:cNvPr id="143" name="Shape 143"/>
+          <p:cNvSpPr/>
+          <p:nvPr>
+            <p:ph type="body" sz="quarter" idx="1"/>
+          </p:nvPr>
+        </p:nvSpPr>
+        <p:spPr>
+          <a:prstGeom prst="rect">
+            <a:avLst/>
+          </a:prstGeom>
+        </p:spPr>
+        <p:txBody>
+          <a:bodyPr/>
+          <a:lstStyle/>
+          <a:p>
+            <a:pPr/>
+          </a:p>
+        </p:txBody>
+      </p:sp>
+    </p:spTree>
+  </p:cSld>
+  <p:clrMapOvr>
+    <a:masterClrMapping/>
+  </p:clrMapOvr>
+</p:notes>
+</file>
+
+<file path=ppt/notesSlides/notesSlide3.xml><?xml version="1.0" encoding="utf-8"?>
+<p:notes xmlns:a="http://schemas.openxmlformats.org/drawingml/2006/main" xmlns:r="http://schemas.openxmlformats.org/officeDocument/2006/relationships" xmlns:p="http://schemas.openxmlformats.org/presentationml/2006/main" showMasterSp="1" showMasterPhAnim="1">
+  <p:cSld>
+    <p:spTree>
+      <p:nvGrpSpPr>
+        <p:cNvPr id="1" name=""/>
+        <p:cNvGrpSpPr/>
+        <p:nvPr/>
+      </p:nvGrpSpPr>
+      <p:grpSpPr>
+        <a:xfrm>
+          <a:off x="0" y="0"/>
+          <a:ext cx="0" cy="0"/>
+          <a:chOff x="0" y="0"/>
+          <a:chExt cx="0" cy="0"/>
+        </a:xfrm>
+      </p:grpSpPr>
+      <p:sp>
+        <p:nvSpPr>
+          <p:cNvPr id="151" name="Shape 151"/>
+          <p:cNvSpPr/>
+          <p:nvPr>
+            <p:ph type="sldImg"/>
+          </p:nvPr>
+        </p:nvSpPr>
+        <p:spPr>
+          <a:prstGeom prst="rect">
+            <a:avLst/>
+          </a:prstGeom>
+        </p:spPr>
+        <p:txBody>
+          <a:bodyPr/>
+          <a:lstStyle/>
+          <a:p>
+            <a:pPr/>
+          </a:p>
+        </p:txBody>
+      </p:sp>
+      <p:sp>
+        <p:nvSpPr>
+          <p:cNvPr id="152" name="Shape 152"/>
+          <p:cNvSpPr/>
+          <p:nvPr>
+            <p:ph type="body" sz="quarter" idx="1"/>
+          </p:nvPr>
+        </p:nvSpPr>
+        <p:spPr>
+          <a:prstGeom prst="rect">
+            <a:avLst/>
+          </a:prstGeom>
+        </p:spPr>
+        <p:txBody>
+          <a:bodyPr/>
+          <a:lstStyle/>
+          <a:p>
+            <a:pPr marL="271182" indent="-271182">
+              <a:buClr>
+                <a:srgbClr val="BEBEBE"/>
+              </a:buClr>
+              <a:buSzPct val="125000"/>
+              <a:buChar char="-"/>
+            </a:pPr>
+            <a:r>
+              <a:t>team size!</a:t>
+            </a:r>
+          </a:p>
+          <a:p>
+            <a:pPr marL="271182" indent="-271182">
+              <a:buClr>
+                <a:srgbClr val="BEBEBE"/>
+              </a:buClr>
+              <a:buSzPct val="125000"/>
+              <a:buChar char="-"/>
+            </a:pPr>
+            <a:r>
+              <a:t>too small to break down. Only if complex to manage</a:t>
+            </a:r>
+          </a:p>
+          <a:p>
+            <a:pPr marL="271182" indent="-271182">
+              <a:buClr>
+                <a:srgbClr val="BEBEBE"/>
+              </a:buClr>
+              <a:buSzPct val="125000"/>
+              <a:buChar char="-"/>
+            </a:pPr>
+            <a:r>
+              <a:t>performance critical.</a:t>
+            </a:r>
+          </a:p>
+        </p:txBody>
+      </p:sp>
+    </p:spTree>
+  </p:cSld>
+  <p:clrMapOvr>
+    <a:masterClrMapping/>
+  </p:clrMapOvr>
+</p:notes>
+</file>
+
+<file path=ppt/notesSlides/notesSlide4.xml><?xml version="1.0" encoding="utf-8"?>
+<p:notes xmlns:a="http://schemas.openxmlformats.org/drawingml/2006/main" xmlns:r="http://schemas.openxmlformats.org/officeDocument/2006/relationships" xmlns:p="http://schemas.openxmlformats.org/presentationml/2006/main" showMasterSp="1" showMasterPhAnim="1">
+  <p:cSld>
+    <p:spTree>
+      <p:nvGrpSpPr>
+        <p:cNvPr id="1" name=""/>
+        <p:cNvGrpSpPr/>
+        <p:nvPr/>
+      </p:nvGrpSpPr>
+      <p:grpSpPr>
+        <a:xfrm>
+          <a:off x="0" y="0"/>
+          <a:ext cx="0" cy="0"/>
+          <a:chOff x="0" y="0"/>
+          <a:chExt cx="0" cy="0"/>
+        </a:xfrm>
+      </p:grpSpPr>
+      <p:sp>
+        <p:nvSpPr>
+          <p:cNvPr id="164" name="Shape 164"/>
+          <p:cNvSpPr/>
+          <p:nvPr>
+            <p:ph type="sldImg"/>
+          </p:nvPr>
+        </p:nvSpPr>
+        <p:spPr>
+          <a:prstGeom prst="rect">
+            <a:avLst/>
+          </a:prstGeom>
+        </p:spPr>
+        <p:txBody>
+          <a:bodyPr/>
+          <a:lstStyle/>
+          <a:p>
+            <a:pPr/>
+          </a:p>
+        </p:txBody>
+      </p:sp>
+      <p:sp>
+        <p:nvSpPr>
+          <p:cNvPr id="165" name="Shape 165"/>
+          <p:cNvSpPr/>
+          <p:nvPr>
+            <p:ph type="body" sz="quarter" idx="1"/>
+          </p:nvPr>
+        </p:nvSpPr>
+        <p:spPr>
+          <a:prstGeom prst="rect">
+            <a:avLst/>
+          </a:prstGeom>
+        </p:spPr>
+        <p:txBody>
+          <a:bodyPr/>
+          <a:lstStyle/>
+          <a:p>
+            <a:pPr/>
+          </a:p>
+          <a:p>
+            <a:pPr/>
+            <a:r>
+              <a:t>Moore's law is the observation that the number of transistors in a dense integrated circuit (IC) doubles about every two years.</a:t>
+            </a:r>
+          </a:p>
+          <a:p>
+            <a:pPr/>
+            <a:r>
+              <a:t> Moore's law is an observation and projection of a historical trend. Rather than a law of physics,</a:t>
+            </a:r>
+          </a:p>
+          <a:p>
+            <a:pPr/>
+          </a:p>
+          <a:p>
+            <a:pPr/>
+          </a:p>
+          <a:p>
+            <a:pPr/>
+            <a:r>
+              <a:t>  it is an empirical relationship linked to gains from experience in production.</a:t>
+            </a:r>
+          </a:p>
+        </p:txBody>
+      </p:sp>
+    </p:spTree>
+  </p:cSld>
+  <p:clrMapOvr>
+    <a:masterClrMapping/>
+  </p:clrMapOvr>
+</p:notes>
+</file>
+
+<file path=ppt/notesSlides/notesSlide5.xml><?xml version="1.0" encoding="utf-8"?>
+<p:notes xmlns:a="http://schemas.openxmlformats.org/drawingml/2006/main" xmlns:r="http://schemas.openxmlformats.org/officeDocument/2006/relationships" xmlns:p="http://schemas.openxmlformats.org/presentationml/2006/main" showMasterSp="1" showMasterPhAnim="1">
+  <p:cSld>
+    <p:spTree>
+      <p:nvGrpSpPr>
+        <p:cNvPr id="1" name=""/>
+        <p:cNvGrpSpPr/>
+        <p:nvPr/>
+      </p:nvGrpSpPr>
+      <p:grpSpPr>
+        <a:xfrm>
+          <a:off x="0" y="0"/>
+          <a:ext cx="0" cy="0"/>
+          <a:chOff x="0" y="0"/>
+          <a:chExt cx="0" cy="0"/>
+        </a:xfrm>
+      </p:grpSpPr>
+      <p:sp>
+        <p:nvSpPr>
+          <p:cNvPr id="172" name="Shape 172"/>
+          <p:cNvSpPr/>
+          <p:nvPr>
+            <p:ph type="sldImg"/>
+          </p:nvPr>
+        </p:nvSpPr>
+        <p:spPr>
+          <a:prstGeom prst="rect">
+            <a:avLst/>
+          </a:prstGeom>
+        </p:spPr>
+        <p:txBody>
+          <a:bodyPr/>
+          <a:lstStyle/>
+          <a:p>
+            <a:pPr/>
+          </a:p>
+        </p:txBody>
+      </p:sp>
+      <p:sp>
+        <p:nvSpPr>
+          <p:cNvPr id="173" name="Shape 173"/>
+          <p:cNvSpPr/>
+          <p:nvPr>
+            <p:ph type="body" sz="quarter" idx="1"/>
+          </p:nvPr>
+        </p:nvSpPr>
+        <p:spPr>
+          <a:prstGeom prst="rect">
+            <a:avLst/>
+          </a:prstGeom>
+        </p:spPr>
+        <p:txBody>
+          <a:bodyPr/>
+          <a:lstStyle/>
+          <a:p>
+            <a:pPr/>
+            <a:r>
+              <a:t>  SOLID: five design principles for object-oriented software development described by Robert C. Martin. </a:t>
+            </a:r>
+          </a:p>
+          <a:p>
+            <a:pPr/>
+            <a:r>
+              <a:t>  Single responsibility: A class should have one, and only one, reason to change.</a:t>
+            </a:r>
+          </a:p>
+          <a:p>
+            <a:pPr/>
+            <a:r>
+              <a:t>  Opne closed: “Software entities (classes, modules, functions, etc.) should be open for extension, but closed for modification.”</a:t>
+            </a:r>
+          </a:p>
+          <a:p>
+            <a:pPr/>
+            <a:r>
+              <a:t>  Liskov substitution: The principle defines that objects of a superclass shall be replaceable with objects of its subclasses without breaking the application.</a:t>
+            </a:r>
+          </a:p>
+          <a:p>
+            <a:pPr/>
+            <a:r>
+              <a:t>  Interface segregation: “Clients should not be forced to depend upon interfaces that they do not use.”</a:t>
+            </a:r>
+          </a:p>
+          <a:p>
+            <a:pPr/>
+            <a:r>
+              <a:t>  Dependency Inversion Principle: High-level modules should not depend on low-level modules. Both should depend on abstractions.</a:t>
+            </a:r>
+          </a:p>
+          <a:p>
+            <a:pPr/>
+            <a:r>
+              <a:t>Abstractions should not depend on details. Details should depend on abstractions.</a:t>
+            </a:r>
+          </a:p>
+        </p:txBody>
+      </p:sp>
+    </p:spTree>
+  </p:cSld>
+  <p:clrMapOvr>
+    <a:masterClrMapping/>
+  </p:clrMapOvr>
+</p:notes>
+</file>
+
+<file path=ppt/notesSlides/notesSlide6.xml><?xml version="1.0" encoding="utf-8"?>
+<p:notes xmlns:a="http://schemas.openxmlformats.org/drawingml/2006/main" xmlns:r="http://schemas.openxmlformats.org/officeDocument/2006/relationships" xmlns:p="http://schemas.openxmlformats.org/presentationml/2006/main" showMasterSp="1" showMasterPhAnim="1">
+  <p:cSld>
+    <p:spTree>
+      <p:nvGrpSpPr>
+        <p:cNvPr id="1" name=""/>
+        <p:cNvGrpSpPr/>
+        <p:nvPr/>
+      </p:nvGrpSpPr>
+      <p:grpSpPr>
+        <a:xfrm>
+          <a:off x="0" y="0"/>
+          <a:ext cx="0" cy="0"/>
+          <a:chOff x="0" y="0"/>
+          <a:chExt cx="0" cy="0"/>
+        </a:xfrm>
+      </p:grpSpPr>
+      <p:sp>
+        <p:nvSpPr>
+          <p:cNvPr id="177" name="Shape 177"/>
+          <p:cNvSpPr/>
+          <p:nvPr>
+            <p:ph type="sldImg"/>
+          </p:nvPr>
+        </p:nvSpPr>
+        <p:spPr>
+          <a:prstGeom prst="rect">
+            <a:avLst/>
+          </a:prstGeom>
+        </p:spPr>
+        <p:txBody>
+          <a:bodyPr/>
+          <a:lstStyle/>
+          <a:p>
+            <a:pPr/>
+          </a:p>
+        </p:txBody>
+      </p:sp>
+      <p:sp>
+        <p:nvSpPr>
+          <p:cNvPr id="178" name="Shape 178"/>
+          <p:cNvSpPr/>
+          <p:nvPr>
+            <p:ph type="body" sz="quarter" idx="1"/>
+          </p:nvPr>
+        </p:nvSpPr>
+        <p:spPr>
+          <a:prstGeom prst="rect">
+            <a:avLst/>
+          </a:prstGeom>
+        </p:spPr>
+        <p:txBody>
+          <a:bodyPr/>
+          <a:lstStyle/>
+          <a:p>
+            <a:pPr/>
+            <a:r>
+              <a:t>  Single responsibility: A class should have one, and only one, reason to change.</a:t>
+            </a:r>
+          </a:p>
+          <a:p>
+            <a:pPr/>
+            <a:r>
+              <a:t>  Opne closed: “Software entities (classes, modules, functions, etc.) should be open for extension, but closed for modification.”</a:t>
+            </a:r>
+          </a:p>
+          <a:p>
+            <a:pPr/>
+            <a:r>
+              <a:t>  Liskov substitution: The principle defines that objects of a superclass shall be replaceable with objects of its subclasses without breaking the application.</a:t>
+            </a:r>
+          </a:p>
+          <a:p>
+            <a:pPr/>
+            <a:r>
+              <a:t>  Interface segregation: “Clients should not be forced to depend upon interfaces that they do not use.”</a:t>
+            </a:r>
+          </a:p>
+          <a:p>
+            <a:pPr/>
+            <a:r>
+              <a:t>  Dependency Inversion Principle: High-level modules should not depend on low-level modules. Both should depend on abstractions.</a:t>
+            </a:r>
+          </a:p>
+          <a:p>
+            <a:pPr/>
+            <a:r>
+              <a:t>Abstractions should not depend on details. Details should depend on abstractions.</a:t>
+            </a:r>
+          </a:p>
+        </p:txBody>
+      </p:sp>
+    </p:spTree>
+  </p:cSld>
+  <p:clrMapOvr>
+    <a:masterClrMapping/>
+  </p:clrMapOvr>
+</p:notes>
+</file>
+
+<file path=ppt/notesSlides/notesSlide7.xml><?xml version="1.0" encoding="utf-8"?>
+<p:notes xmlns:a="http://schemas.openxmlformats.org/drawingml/2006/main" xmlns:r="http://schemas.openxmlformats.org/officeDocument/2006/relationships" xmlns:p="http://schemas.openxmlformats.org/presentationml/2006/main" showMasterSp="1" showMasterPhAnim="1">
+  <p:cSld>
+    <p:spTree>
+      <p:nvGrpSpPr>
+        <p:cNvPr id="1" name=""/>
+        <p:cNvGrpSpPr/>
+        <p:nvPr/>
+      </p:nvGrpSpPr>
+      <p:grpSpPr>
+        <a:xfrm>
+          <a:off x="0" y="0"/>
+          <a:ext cx="0" cy="0"/>
+          <a:chOff x="0" y="0"/>
+          <a:chExt cx="0" cy="0"/>
+        </a:xfrm>
+      </p:grpSpPr>
+      <p:sp>
+        <p:nvSpPr>
+          <p:cNvPr id="184" name="Shape 184"/>
+          <p:cNvSpPr/>
+          <p:nvPr>
+            <p:ph type="sldImg"/>
+          </p:nvPr>
+        </p:nvSpPr>
+        <p:spPr>
+          <a:prstGeom prst="rect">
+            <a:avLst/>
+          </a:prstGeom>
+        </p:spPr>
+        <p:txBody>
+          <a:bodyPr/>
+          <a:lstStyle/>
+          <a:p>
+            <a:pPr/>
+          </a:p>
+        </p:txBody>
+      </p:sp>
+      <p:sp>
+        <p:nvSpPr>
+          <p:cNvPr id="185" name="Shape 185"/>
+          <p:cNvSpPr/>
+          <p:nvPr>
+            <p:ph type="body" sz="quarter" idx="1"/>
+          </p:nvPr>
+        </p:nvSpPr>
+        <p:spPr>
+          <a:prstGeom prst="rect">
+            <a:avLst/>
+          </a:prstGeom>
+        </p:spPr>
+        <p:txBody>
+          <a:bodyPr/>
+          <a:lstStyle/>
+          <a:p>
+            <a:pPr/>
+            <a:r>
+              <a:t>Independent of Frameworks. The architecture does not depend on the existence of some library of feature laden software. This allows you to use such frameworks as tools, rather than having to cram your system into their limited constraints.</a:t>
+            </a:r>
+          </a:p>
+          <a:p>
+            <a:pPr/>
+          </a:p>
+          <a:p>
+            <a:pPr/>
+            <a:r>
+              <a:t>Testable. The business rules can be tested without the UI, Database, Web Server, or any other external element.</a:t>
+            </a:r>
+          </a:p>
+          <a:p>
+            <a:pPr/>
+          </a:p>
+          <a:p>
+            <a:pPr/>
+            <a:r>
+              <a:t>Independent of UI. The UI can change easily, without changing the rest of the system. A Web UI could be replaced with a console UI, for example, without changing the business rules.</a:t>
+            </a:r>
+          </a:p>
+          <a:p>
+            <a:pPr/>
+          </a:p>
+          <a:p>
+            <a:pPr/>
+            <a:r>
+              <a:t>Independent of Database. You can swap out Oracle or SQL Server, for Mongo, BigTable, CouchDB, or something else. Your business rules are not bound to the database.</a:t>
+            </a:r>
+          </a:p>
+          <a:p>
+            <a:pPr/>
+          </a:p>
+          <a:p>
+            <a:pPr/>
+            <a:r>
+              <a:t>Independent of any external agency. In fact your business rules simply don’t know anything at all about the outside world.</a:t>
+            </a:r>
+          </a:p>
+          <a:p>
+            <a:pPr/>
+          </a:p>
+          <a:p>
+            <a:pPr/>
+            <a:r>
+              <a:t>Dependncy rule: </a:t>
+            </a:r>
+          </a:p>
+          <a:p>
+            <a:pPr/>
+            <a:r>
+              <a:t>This rule says that source code dependencies can only point inwards. Nothing in an inner circle can know anything at all about something in an outer circle. In particular, the name of something declared in an outer circle must not be mentioned by the code in the an inner circle. That includes, functions, classes. variables, or any other named software entity.</a:t>
+            </a:r>
+          </a:p>
+          <a:p>
+            <a:pPr/>
+          </a:p>
+          <a:p>
+            <a:pPr/>
+            <a:r>
+              <a:t>Entities</a:t>
+            </a:r>
+          </a:p>
+          <a:p>
+            <a:pPr/>
+            <a:r>
+              <a:t>Entities encapsulate Enterprise wide business rules. An entity can be an object with methods, or it can be a set of data structures and functions</a:t>
+            </a:r>
+          </a:p>
+          <a:p>
+            <a:pPr/>
+          </a:p>
+          <a:p>
+            <a:pPr/>
+            <a:r>
+              <a:t>use cases</a:t>
+            </a:r>
+          </a:p>
+          <a:p>
+            <a:pPr/>
+            <a:r>
+              <a:t>The software in this layer contains application specific business rules. It encapsulates and implements all of the use cases of the system.</a:t>
+            </a:r>
+          </a:p>
+        </p:txBody>
+      </p:sp>
+    </p:spTree>
+  </p:cSld>
+  <p:clrMapOvr>
+    <a:masterClrMapping/>
+  </p:clrMapOvr>
+</p:notes>
+</file>
+
+<file path=ppt/notesSlides/notesSlide8.xml><?xml version="1.0" encoding="utf-8"?>
+<p:notes xmlns:a="http://schemas.openxmlformats.org/drawingml/2006/main" xmlns:r="http://schemas.openxmlformats.org/officeDocument/2006/relationships" xmlns:p="http://schemas.openxmlformats.org/presentationml/2006/main" showMasterSp="1" showMasterPhAnim="1">
+  <p:cSld>
+    <p:spTree>
+      <p:nvGrpSpPr>
+        <p:cNvPr id="1" name=""/>
+        <p:cNvGrpSpPr/>
+        <p:nvPr/>
+      </p:nvGrpSpPr>
+      <p:grpSpPr>
+        <a:xfrm>
+          <a:off x="0" y="0"/>
+          <a:ext cx="0" cy="0"/>
+          <a:chOff x="0" y="0"/>
+          <a:chExt cx="0" cy="0"/>
+        </a:xfrm>
+      </p:grpSpPr>
+      <p:sp>
+        <p:nvSpPr>
+          <p:cNvPr id="209" name="Shape 209"/>
+          <p:cNvSpPr/>
+          <p:nvPr>
+            <p:ph type="sldImg"/>
+          </p:nvPr>
+        </p:nvSpPr>
+        <p:spPr>
+          <a:prstGeom prst="rect">
+            <a:avLst/>
+          </a:prstGeom>
+        </p:spPr>
+        <p:txBody>
+          <a:bodyPr/>
+          <a:lstStyle/>
+          <a:p>
+            <a:pPr/>
+          </a:p>
+        </p:txBody>
+      </p:sp>
+      <p:sp>
+        <p:nvSpPr>
+          <p:cNvPr id="210" name="Shape 210"/>
+          <p:cNvSpPr/>
+          <p:nvPr>
+            <p:ph type="body" sz="quarter" idx="1"/>
+          </p:nvPr>
+        </p:nvSpPr>
+        <p:spPr>
+          <a:prstGeom prst="rect">
+            <a:avLst/>
+          </a:prstGeom>
+        </p:spPr>
+        <p:txBody>
+          <a:bodyPr/>
+          <a:lstStyle/>
+          <a:p>
+            <a:pPr/>
+            <a:r>
+              <a:t>Kotlin Native has nothing in common with SubstrateVM (Graal is a runtime, Substrate is its part which allows AOT builds). These tools cover different use cases. K-N is used to create a multi-platform or stand-alone native applications, Substrate is used to pre-compile JVM applications for faster startup.</a:t>
+            </a:r>
+          </a:p>
+        </p:txBody>
+      </p:sp>
+    </p:spTree>
+  </p:cSld>
+  <p:clrMapOvr>
+    <a:masterClrMapping/>
+  </p:clrMapOvr>
+</p:notes>
+</file>
+
 <file path=ppt/slideLayouts/slideLayout1.xml><?xml version="1.0" encoding="utf-8"?>
 <p:sldLayout xmlns:a="http://schemas.openxmlformats.org/drawingml/2006/main" xmlns:r="http://schemas.openxmlformats.org/officeDocument/2006/relationships" xmlns:p="http://schemas.openxmlformats.org/presentationml/2006/main" type="title" showMasterSp="1" showMasterPhAnim="1">
   <p:cSld name="Title &amp; Subtitle">
@@ -1089,8 +1888,8 @@
         </p:nvSpPr>
         <p:spPr>
           <a:xfrm>
-            <a:off x="507999" y="8204199"/>
-            <a:ext cx="11988801" cy="838201"/>
+            <a:off x="508000" y="8204200"/>
+            <a:ext cx="11988800" cy="838200"/>
           </a:xfrm>
           <a:prstGeom prst="rect">
             <a:avLst/>
@@ -3765,7 +4564,7 @@
           <p:nvPr/>
         </p:nvPicPr>
         <p:blipFill>
-          <a:blip r:embed="rId2">
+          <a:blip r:embed="rId3">
             <a:extLst/>
           </a:blip>
           <a:stretch>
@@ -3853,7 +4652,7 @@
       </p:grpSpPr>
       <p:sp>
         <p:nvSpPr>
-          <p:cNvPr id="167" name="Shape 167"/>
+          <p:cNvPr id="180" name="Shape 180"/>
           <p:cNvSpPr/>
           <p:nvPr/>
         </p:nvSpPr>
@@ -3897,14 +4696,14 @@
       </p:sp>
       <p:pic>
         <p:nvPicPr>
-          <p:cNvPr id="168" name="CleanArchitecture.jpg"/>
+          <p:cNvPr id="181" name="CleanArchitecture.jpg"/>
           <p:cNvPicPr>
             <a:picLocks noChangeAspect="1"/>
           </p:cNvPicPr>
           <p:nvPr/>
         </p:nvPicPr>
         <p:blipFill>
-          <a:blip r:embed="rId2">
+          <a:blip r:embed="rId3">
             <a:extLst/>
           </a:blip>
           <a:stretch>
@@ -3913,8 +4712,8 @@
         </p:blipFill>
         <p:spPr>
           <a:xfrm>
-            <a:off x="1600199" y="1541124"/>
-            <a:ext cx="9083391" cy="6671352"/>
+            <a:off x="1600200" y="1541124"/>
+            <a:ext cx="9083390" cy="6671352"/>
           </a:xfrm>
           <a:prstGeom prst="rect">
             <a:avLst/>
@@ -3926,14 +4725,14 @@
       </p:pic>
       <p:sp>
         <p:nvSpPr>
-          <p:cNvPr id="169" name="Shape 169"/>
+          <p:cNvPr id="182" name="Shape 182"/>
           <p:cNvSpPr/>
           <p:nvPr/>
         </p:nvSpPr>
         <p:spPr>
           <a:xfrm>
-            <a:off x="6041516" y="4565650"/>
-            <a:ext cx="921768" cy="622300"/>
+            <a:off x="6041516" y="4565649"/>
+            <a:ext cx="921768" cy="622301"/>
           </a:xfrm>
           <a:prstGeom prst="rect">
             <a:avLst/>
@@ -3954,7 +4753,7 @@
       </p:sp>
       <p:sp>
         <p:nvSpPr>
-          <p:cNvPr id="170" name="Shape 170"/>
+          <p:cNvPr id="183" name="Shape 183"/>
           <p:cNvSpPr/>
           <p:nvPr/>
         </p:nvSpPr>
@@ -3982,7 +4781,7 @@
           <a:lstStyle>
             <a:lvl1pPr>
               <a:defRPr sz="2500" u="sng">
-                <a:hlinkClick r:id="rId3" invalidUrl="" action="" tgtFrame="" tooltip="" history="1" highlightClick="0" endSnd="0"/>
+                <a:hlinkClick r:id="rId4" invalidUrl="" action="" tgtFrame="" tooltip="" history="1" highlightClick="0" endSnd="0"/>
               </a:defRPr>
             </a:lvl1pPr>
           </a:lstStyle>
@@ -3992,7 +4791,7 @@
             </a:pPr>
             <a:r>
               <a:rPr u="sng">
-                <a:hlinkClick r:id="rId3" invalidUrl="" action="" tgtFrame="" tooltip="" history="1" highlightClick="0" endSnd="0"/>
+                <a:hlinkClick r:id="rId4" invalidUrl="" action="" tgtFrame="" tooltip="" history="1" highlightClick="0" endSnd="0"/>
               </a:rPr>
               <a:t>https://blog.cleancoder.com/uncle-bob/2012/08/13/the-clean-architecture.html</a:t>
             </a:r>
@@ -4027,7 +4826,7 @@
       </p:grpSpPr>
       <p:sp>
         <p:nvSpPr>
-          <p:cNvPr id="172" name="Shape 172"/>
+          <p:cNvPr id="187" name="Shape 187"/>
           <p:cNvSpPr/>
           <p:nvPr/>
         </p:nvSpPr>
@@ -4071,7 +4870,7 @@
       </p:sp>
       <p:sp>
         <p:nvSpPr>
-          <p:cNvPr id="173" name="Shape 173"/>
+          <p:cNvPr id="188" name="Shape 188"/>
           <p:cNvSpPr/>
           <p:nvPr/>
         </p:nvSpPr>
@@ -4144,7 +4943,7 @@
       </p:grpSpPr>
       <p:sp>
         <p:nvSpPr>
-          <p:cNvPr id="175" name="Shape 175"/>
+          <p:cNvPr id="190" name="Shape 190"/>
           <p:cNvSpPr/>
           <p:nvPr/>
         </p:nvSpPr>
@@ -4188,14 +4987,14 @@
       </p:sp>
       <p:sp>
         <p:nvSpPr>
-          <p:cNvPr id="176" name="Shape 176"/>
+          <p:cNvPr id="191" name="Shape 191"/>
           <p:cNvSpPr/>
           <p:nvPr/>
         </p:nvSpPr>
         <p:spPr>
           <a:xfrm>
-            <a:off x="638215" y="3402260"/>
-            <a:ext cx="11749950" cy="1397001"/>
+            <a:off x="638215" y="3186360"/>
+            <a:ext cx="12084441" cy="1828801"/>
           </a:xfrm>
           <a:prstGeom prst="rect">
             <a:avLst/>
@@ -4259,7 +5058,7 @@
               <a:rPr u="sng">
                 <a:hlinkClick r:id="rId4" invalidUrl="" action="" tgtFrame="" tooltip="" history="1" highlightClick="0" endSnd="0"/>
               </a:rPr>
-              <a:t>https://kotlinlang.org/docs/reference/coroutines/flow.html</a:t>
+              <a:t>https://kotlinlang.org/docs/reference/coroutines/coroutines-guide.html</a:t>
             </a:r>
           </a:p>
         </p:txBody>
@@ -4292,7 +5091,7 @@
       </p:grpSpPr>
       <p:sp>
         <p:nvSpPr>
-          <p:cNvPr id="178" name="Shape 178"/>
+          <p:cNvPr id="193" name="Shape 193"/>
           <p:cNvSpPr/>
           <p:nvPr/>
         </p:nvSpPr>
@@ -4336,14 +5135,14 @@
       </p:sp>
       <p:sp>
         <p:nvSpPr>
-          <p:cNvPr id="179" name="Shape 179"/>
+          <p:cNvPr id="194" name="Shape 194"/>
           <p:cNvSpPr/>
           <p:nvPr/>
         </p:nvSpPr>
         <p:spPr>
           <a:xfrm>
             <a:off x="1187338" y="4162109"/>
-            <a:ext cx="7463881" cy="622301"/>
+            <a:ext cx="7463880" cy="622301"/>
           </a:xfrm>
           <a:prstGeom prst="rect">
             <a:avLst/>
@@ -4407,14 +5206,14 @@
       </p:grpSpPr>
       <p:sp>
         <p:nvSpPr>
-          <p:cNvPr id="181" name="Shape 181"/>
+          <p:cNvPr id="196" name="Shape 196"/>
           <p:cNvSpPr/>
           <p:nvPr/>
         </p:nvSpPr>
         <p:spPr>
           <a:xfrm>
             <a:off x="247517" y="483679"/>
-            <a:ext cx="2162772" cy="622301"/>
+            <a:ext cx="5545337" cy="622301"/>
           </a:xfrm>
           <a:prstGeom prst="rect">
             <a:avLst/>
@@ -4444,21 +5243,21 @@
           <a:p>
             <a:pPr/>
             <a:r>
-              <a:t>Resiliency</a:t>
-            </a:r>
-          </a:p>
-        </p:txBody>
-      </p:sp>
-      <p:sp>
-        <p:nvSpPr>
-          <p:cNvPr id="182" name="Shape 182"/>
+              <a:t>Resiliency and Observability</a:t>
+            </a:r>
+          </a:p>
+        </p:txBody>
+      </p:sp>
+      <p:sp>
+        <p:nvSpPr>
+          <p:cNvPr id="197" name="Shape 197"/>
           <p:cNvSpPr/>
           <p:nvPr/>
         </p:nvSpPr>
         <p:spPr>
           <a:xfrm>
-            <a:off x="1214214" y="3117205"/>
-            <a:ext cx="3467846" cy="2184401"/>
+            <a:off x="810674" y="1135877"/>
+            <a:ext cx="7738245" cy="4267201"/>
           </a:xfrm>
           <a:prstGeom prst="rect">
             <a:avLst/>
@@ -4511,6 +5310,180 @@
             </a:pPr>
             <a:r>
               <a:t>Cache</a:t>
+            </a:r>
+          </a:p>
+          <a:p>
+            <a:pPr marL="228600" indent="-228600" algn="l">
+              <a:buSzPct val="100000"/>
+              <a:buChar char="•"/>
+            </a:pPr>
+            <a:r>
+              <a:t>actuators</a:t>
+            </a:r>
+          </a:p>
+          <a:p>
+            <a:pPr marL="228600" indent="-228600" algn="l">
+              <a:buSzPct val="100000"/>
+              <a:buChar char="•"/>
+            </a:pPr>
+            <a:r>
+              <a:t>metrics (web, infrastructure, functional)</a:t>
+            </a:r>
+          </a:p>
+          <a:p>
+            <a:pPr marL="228600" indent="-228600" algn="l">
+              <a:buSzPct val="100000"/>
+              <a:buChar char="•"/>
+            </a:pPr>
+            <a:r>
+              <a:t>tracing</a:t>
+            </a:r>
+          </a:p>
+          <a:p>
+            <a:pPr marL="228600" indent="-228600" algn="l">
+              <a:buSzPct val="100000"/>
+              <a:buChar char="•"/>
+            </a:pPr>
+            <a:r>
+              <a:t>async logs</a:t>
+            </a:r>
+          </a:p>
+        </p:txBody>
+      </p:sp>
+      <p:sp>
+        <p:nvSpPr>
+          <p:cNvPr id="198" name="Shape 198"/>
+          <p:cNvSpPr/>
+          <p:nvPr/>
+        </p:nvSpPr>
+        <p:spPr>
+          <a:xfrm>
+            <a:off x="540735" y="6024605"/>
+            <a:ext cx="6801297" cy="622301"/>
+          </a:xfrm>
+          <a:prstGeom prst="rect">
+            <a:avLst/>
+          </a:prstGeom>
+          <a:ln w="12700">
+            <a:miter lim="400000"/>
+          </a:ln>
+          <a:extLst>
+            <a:ext uri="{C572A759-6A51-4108-AA02-DFA0A04FC94B}">
+              <ma14:wrappingTextBoxFlag xmlns:ma14="http://schemas.microsoft.com/office/mac/drawingml/2011/main" val="1"/>
+            </a:ext>
+          </a:extLst>
+        </p:spPr>
+        <p:txBody>
+          <a:bodyPr wrap="none" lIns="50800" tIns="50800" rIns="50800" bIns="50800" anchor="ctr">
+            <a:spAutoFit/>
+          </a:bodyPr>
+          <a:lstStyle>
+            <a:lvl1pPr algn="l">
+              <a:defRPr>
+                <a:solidFill>
+                  <a:srgbClr val="000000"/>
+                </a:solidFill>
+              </a:defRPr>
+            </a:lvl1pPr>
+          </a:lstStyle>
+          <a:p>
+            <a:pPr/>
+            <a:r>
+              <a:t>Lightweight frameworks (examples):</a:t>
+            </a:r>
+          </a:p>
+        </p:txBody>
+      </p:sp>
+      <p:sp>
+        <p:nvSpPr>
+          <p:cNvPr id="199" name="Shape 199"/>
+          <p:cNvSpPr/>
+          <p:nvPr/>
+        </p:nvSpPr>
+        <p:spPr>
+          <a:xfrm>
+            <a:off x="643307" y="6668510"/>
+            <a:ext cx="12683507" cy="2082801"/>
+          </a:xfrm>
+          <a:prstGeom prst="rect">
+            <a:avLst/>
+          </a:prstGeom>
+          <a:ln w="12700">
+            <a:miter lim="400000"/>
+          </a:ln>
+          <a:extLst>
+            <a:ext uri="{C572A759-6A51-4108-AA02-DFA0A04FC94B}">
+              <ma14:wrappingTextBoxFlag xmlns:ma14="http://schemas.microsoft.com/office/mac/drawingml/2011/main" val="1"/>
+            </a:ext>
+          </a:extLst>
+        </p:spPr>
+        <p:txBody>
+          <a:bodyPr lIns="50800" tIns="50800" rIns="50800" bIns="50800" anchor="ctr">
+            <a:spAutoFit/>
+          </a:bodyPr>
+          <a:lstStyle/>
+          <a:p>
+            <a:pPr marL="228600" indent="-228600" algn="l">
+              <a:buSzPct val="100000"/>
+              <a:buChar char="•"/>
+              <a:defRPr sz="3400"/>
+            </a:pPr>
+            <a:r>
+              <a:t>resilience4j: </a:t>
+            </a:r>
+            <a:r>
+              <a:rPr u="sng">
+                <a:hlinkClick r:id="rId2" invalidUrl="" action="" tgtFrame="" tooltip="" history="1" highlightClick="0" endSnd="0"/>
+              </a:rPr>
+              <a:t>https://github.com/resilience4j/resilience4j</a:t>
+            </a:r>
+          </a:p>
+          <a:p>
+            <a:pPr marL="228600" indent="-228600" algn="l">
+              <a:buSzPct val="100000"/>
+              <a:buChar char="•"/>
+              <a:defRPr sz="3400"/>
+            </a:pPr>
+            <a:r>
+              <a:t>micrometer: </a:t>
+            </a:r>
+            <a:r>
+              <a:rPr u="sng">
+                <a:hlinkClick r:id="rId3" invalidUrl="" action="" tgtFrame="" tooltip="" history="1" highlightClick="0" endSnd="0"/>
+              </a:rPr>
+              <a:t>https://github.com/micrometer-metrics/micrometer</a:t>
+            </a:r>
+          </a:p>
+          <a:p>
+            <a:pPr marL="228600" indent="-228600" algn="l">
+              <a:buSzPct val="100000"/>
+              <a:buChar char="•"/>
+              <a:defRPr sz="3400"/>
+            </a:pPr>
+            <a:r>
+              <a:t>zipkin: </a:t>
+            </a:r>
+            <a:r>
+              <a:rPr u="sng">
+                <a:hlinkClick r:id="rId4" invalidUrl="" action="" tgtFrame="" tooltip="" history="1" highlightClick="0" endSnd="0"/>
+              </a:rPr>
+              <a:t>https://github.com/openzipkin/zipkin</a:t>
+            </a:r>
+          </a:p>
+          <a:p>
+            <a:pPr marL="228600" indent="-228600" algn="l">
+              <a:buSzPct val="100000"/>
+              <a:buChar char="•"/>
+              <a:defRPr sz="3400"/>
+            </a:pPr>
+            <a:r>
+              <a:t>lmax-log4j2: </a:t>
+            </a:r>
+            <a:r>
+              <a:rPr u="sng">
+                <a:hlinkClick r:id="rId5" invalidUrl="" action="" tgtFrame="" tooltip="" history="1" highlightClick="0" endSnd="0"/>
+              </a:rPr>
+              <a:t>https://logging.apache.org/log4j/2.x/manual/async.html</a:t>
             </a:r>
           </a:p>
         </p:txBody>
@@ -4541,16 +5514,45 @@
           <a:chExt cx="0" cy="0"/>
         </a:xfrm>
       </p:grpSpPr>
-      <p:sp>
-        <p:nvSpPr>
-          <p:cNvPr id="184" name="Shape 184"/>
-          <p:cNvSpPr/>
+      <p:pic>
+        <p:nvPicPr>
+          <p:cNvPr id="201" name="pasted-image.jpeg"/>
+          <p:cNvPicPr>
+            <a:picLocks noChangeAspect="1"/>
+          </p:cNvPicPr>
           <p:nvPr/>
-        </p:nvSpPr>
+        </p:nvPicPr>
+        <p:blipFill>
+          <a:blip r:embed="rId2">
+            <a:extLst/>
+          </a:blip>
+          <a:stretch>
+            <a:fillRect/>
+          </a:stretch>
+        </p:blipFill>
         <p:spPr>
           <a:xfrm>
-            <a:off x="5268346" y="4397373"/>
-            <a:ext cx="2157692" cy="927101"/>
+            <a:off x="413958" y="1452051"/>
+            <a:ext cx="12176884" cy="6849498"/>
+          </a:xfrm>
+          <a:prstGeom prst="rect">
+            <a:avLst/>
+          </a:prstGeom>
+          <a:ln w="12700">
+            <a:miter lim="400000"/>
+          </a:ln>
+        </p:spPr>
+      </p:pic>
+      <p:sp>
+        <p:nvSpPr>
+          <p:cNvPr id="202" name="Shape 202"/>
+          <p:cNvSpPr/>
+          <p:nvPr/>
+        </p:nvSpPr>
+        <p:spPr>
+          <a:xfrm>
+            <a:off x="398390" y="455471"/>
+            <a:ext cx="2404542" cy="622301"/>
           </a:xfrm>
           <a:prstGeom prst="rect">
             <a:avLst/>
@@ -4570,6 +5572,116 @@
           </a:bodyPr>
           <a:lstStyle>
             <a:lvl1pPr>
+              <a:defRPr>
+                <a:solidFill>
+                  <a:srgbClr val="000000"/>
+                </a:solidFill>
+              </a:defRPr>
+            </a:lvl1pPr>
+          </a:lstStyle>
+          <a:p>
+            <a:pPr/>
+            <a:r>
+              <a:t>Comparison</a:t>
+            </a:r>
+          </a:p>
+        </p:txBody>
+      </p:sp>
+      <p:sp>
+        <p:nvSpPr>
+          <p:cNvPr id="203" name="Shape 203"/>
+          <p:cNvSpPr/>
+          <p:nvPr/>
+        </p:nvSpPr>
+        <p:spPr>
+          <a:xfrm>
+            <a:off x="402803" y="8813441"/>
+            <a:ext cx="12453194" cy="457201"/>
+          </a:xfrm>
+          <a:prstGeom prst="rect">
+            <a:avLst/>
+          </a:prstGeom>
+          <a:ln w="12700">
+            <a:miter lim="400000"/>
+          </a:ln>
+          <a:extLst>
+            <a:ext uri="{C572A759-6A51-4108-AA02-DFA0A04FC94B}">
+              <ma14:wrappingTextBoxFlag xmlns:ma14="http://schemas.microsoft.com/office/mac/drawingml/2011/main" val="1"/>
+            </a:ext>
+          </a:extLst>
+        </p:spPr>
+        <p:txBody>
+          <a:bodyPr wrap="none" lIns="50800" tIns="50800" rIns="50800" bIns="50800" anchor="ctr">
+            <a:spAutoFit/>
+          </a:bodyPr>
+          <a:lstStyle>
+            <a:lvl1pPr>
+              <a:defRPr sz="2400"/>
+            </a:lvl1pPr>
+          </a:lstStyle>
+          <a:p>
+            <a:pPr/>
+            <a:r>
+              <a:t>https://micronaut.io/blog/2020-04-07-micronaut-vs-quarkus-vs-spring-boot-performance-jdk-14.html</a:t>
+            </a:r>
+          </a:p>
+        </p:txBody>
+      </p:sp>
+    </p:spTree>
+  </p:cSld>
+  <p:clrMapOvr>
+    <a:masterClrMapping/>
+  </p:clrMapOvr>
+  <p:transition xmlns:p14="http://schemas.microsoft.com/office/powerpoint/2010/main" spd="med" advClick="1"/>
+</p:sld>
+</file>
+
+<file path=ppt/slides/slide16.xml><?xml version="1.0" encoding="utf-8"?>
+<p:sld xmlns:a="http://schemas.openxmlformats.org/drawingml/2006/main" xmlns:r="http://schemas.openxmlformats.org/officeDocument/2006/relationships" xmlns:p="http://schemas.openxmlformats.org/presentationml/2006/main" showMasterSp="1" showMasterPhAnim="1">
+  <p:cSld>
+    <p:spTree>
+      <p:nvGrpSpPr>
+        <p:cNvPr id="1" name=""/>
+        <p:cNvGrpSpPr/>
+        <p:nvPr/>
+      </p:nvGrpSpPr>
+      <p:grpSpPr>
+        <a:xfrm>
+          <a:off x="0" y="0"/>
+          <a:ext cx="0" cy="0"/>
+          <a:chOff x="0" y="0"/>
+          <a:chExt cx="0" cy="0"/>
+        </a:xfrm>
+      </p:grpSpPr>
+      <p:sp>
+        <p:nvSpPr>
+          <p:cNvPr id="205" name="Shape 205"/>
+          <p:cNvSpPr/>
+          <p:nvPr/>
+        </p:nvSpPr>
+        <p:spPr>
+          <a:xfrm>
+            <a:off x="5268346" y="4397373"/>
+            <a:ext cx="2157692" cy="927101"/>
+          </a:xfrm>
+          <a:prstGeom prst="rect">
+            <a:avLst/>
+          </a:prstGeom>
+          <a:ln w="12700">
+            <a:miter lim="400000"/>
+          </a:ln>
+          <a:extLst>
+            <a:ext uri="{C572A759-6A51-4108-AA02-DFA0A04FC94B}">
+              <ma14:wrappingTextBoxFlag xmlns:ma14="http://schemas.microsoft.com/office/mac/drawingml/2011/main" val="1"/>
+            </a:ext>
+          </a:extLst>
+        </p:spPr>
+        <p:txBody>
+          <a:bodyPr wrap="none" lIns="50800" tIns="50800" rIns="50800" bIns="50800" anchor="ctr">
+            <a:spAutoFit/>
+          </a:bodyPr>
+          <a:lstStyle>
+            <a:lvl1pPr>
               <a:defRPr sz="5700"/>
             </a:lvl1pPr>
           </a:lstStyle>
@@ -4577,6 +5689,121 @@
             <a:pPr/>
             <a:r>
               <a:t>Demo!</a:t>
+            </a:r>
+          </a:p>
+        </p:txBody>
+      </p:sp>
+    </p:spTree>
+  </p:cSld>
+  <p:clrMapOvr>
+    <a:masterClrMapping/>
+  </p:clrMapOvr>
+  <p:transition xmlns:p14="http://schemas.microsoft.com/office/powerpoint/2010/main" spd="med" advClick="1"/>
+</p:sld>
+</file>
+
+<file path=ppt/slides/slide17.xml><?xml version="1.0" encoding="utf-8"?>
+<p:sld xmlns:a="http://schemas.openxmlformats.org/drawingml/2006/main" xmlns:r="http://schemas.openxmlformats.org/officeDocument/2006/relationships" xmlns:p="http://schemas.openxmlformats.org/presentationml/2006/main" showMasterSp="1" showMasterPhAnim="1">
+  <p:cSld>
+    <p:spTree>
+      <p:nvGrpSpPr>
+        <p:cNvPr id="1" name=""/>
+        <p:cNvGrpSpPr/>
+        <p:nvPr/>
+      </p:nvGrpSpPr>
+      <p:grpSpPr>
+        <a:xfrm>
+          <a:off x="0" y="0"/>
+          <a:ext cx="0" cy="0"/>
+          <a:chOff x="0" y="0"/>
+          <a:chExt cx="0" cy="0"/>
+        </a:xfrm>
+      </p:grpSpPr>
+      <p:sp>
+        <p:nvSpPr>
+          <p:cNvPr id="207" name="Shape 207"/>
+          <p:cNvSpPr/>
+          <p:nvPr/>
+        </p:nvSpPr>
+        <p:spPr>
+          <a:xfrm>
+            <a:off x="234799" y="576804"/>
+            <a:ext cx="1557785" cy="622301"/>
+          </a:xfrm>
+          <a:prstGeom prst="rect">
+            <a:avLst/>
+          </a:prstGeom>
+          <a:ln w="12700">
+            <a:miter lim="400000"/>
+          </a:ln>
+          <a:extLst>
+            <a:ext uri="{C572A759-6A51-4108-AA02-DFA0A04FC94B}">
+              <ma14:wrappingTextBoxFlag xmlns:ma14="http://schemas.microsoft.com/office/mac/drawingml/2011/main" val="1"/>
+            </a:ext>
+          </a:extLst>
+        </p:spPr>
+        <p:txBody>
+          <a:bodyPr wrap="none" lIns="50800" tIns="50800" rIns="50800" bIns="50800" anchor="ctr">
+            <a:spAutoFit/>
+          </a:bodyPr>
+          <a:lstStyle>
+            <a:lvl1pPr algn="l">
+              <a:defRPr>
+                <a:solidFill>
+                  <a:srgbClr val="000000"/>
+                </a:solidFill>
+              </a:defRPr>
+            </a:lvl1pPr>
+          </a:lstStyle>
+          <a:p>
+            <a:pPr/>
+            <a:r>
+              <a:t>Future</a:t>
+            </a:r>
+          </a:p>
+        </p:txBody>
+      </p:sp>
+      <p:sp>
+        <p:nvSpPr>
+          <p:cNvPr id="208" name="Shape 208"/>
+          <p:cNvSpPr/>
+          <p:nvPr/>
+        </p:nvSpPr>
+        <p:spPr>
+          <a:xfrm>
+            <a:off x="712614" y="3621714"/>
+            <a:ext cx="9671969" cy="622301"/>
+          </a:xfrm>
+          <a:prstGeom prst="rect">
+            <a:avLst/>
+          </a:prstGeom>
+          <a:ln w="12700">
+            <a:miter lim="400000"/>
+          </a:ln>
+          <a:extLst>
+            <a:ext uri="{C572A759-6A51-4108-AA02-DFA0A04FC94B}">
+              <ma14:wrappingTextBoxFlag xmlns:ma14="http://schemas.microsoft.com/office/mac/drawingml/2011/main" val="1"/>
+            </a:ext>
+          </a:extLst>
+        </p:spPr>
+        <p:txBody>
+          <a:bodyPr wrap="none" lIns="50800" tIns="50800" rIns="50800" bIns="50800" anchor="ctr">
+            <a:spAutoFit/>
+          </a:bodyPr>
+          <a:lstStyle/>
+          <a:p>
+            <a:pPr marL="228600" indent="-228600" algn="l">
+              <a:buSzPct val="100000"/>
+              <a:buChar char="•"/>
+            </a:pPr>
+            <a:r>
+              <a:t>GraalVM: </a:t>
+            </a:r>
+            <a:r>
+              <a:rPr u="sng">
+                <a:hlinkClick r:id="rId3" invalidUrl="" action="" tgtFrame="" tooltip="" history="1" highlightClick="0" endSnd="0"/>
+              </a:rPr>
+              <a:t>https://www.graalvm.org/docs/why-graal/</a:t>
             </a:r>
           </a:p>
         </p:txBody>
@@ -4620,7 +5847,7 @@
       </p:grpSpPr>
       <p:sp>
         <p:nvSpPr>
-          <p:cNvPr id="136" name="Shape 136"/>
+          <p:cNvPr id="138" name="Shape 138"/>
           <p:cNvSpPr/>
           <p:nvPr>
             <p:ph type="title"/>
@@ -4680,7 +5907,7 @@
             </a:r>
             <a:r>
               <a:rPr u="sng">
-                <a:hlinkClick r:id="rId2" invalidUrl="" action="" tgtFrame="" tooltip="" history="1" highlightClick="0" endSnd="0"/>
+                <a:hlinkClick r:id="rId3" invalidUrl="" action="" tgtFrame="" tooltip="" history="1" highlightClick="0" endSnd="0"/>
               </a:rPr>
               <a:t>https://twitter.com/ankur4u007</a:t>
             </a:r>
@@ -4702,7 +5929,7 @@
             </a:r>
             <a:r>
               <a:rPr u="sng">
-                <a:hlinkClick r:id="rId3" invalidUrl="" action="" tgtFrame="" tooltip="" history="1" highlightClick="0" endSnd="0"/>
+                <a:hlinkClick r:id="rId4" invalidUrl="" action="" tgtFrame="" tooltip="" history="1" highlightClick="0" endSnd="0"/>
               </a:rPr>
               <a:t>https://github.com/ankur4u007</a:t>
             </a:r>
@@ -4724,7 +5951,7 @@
             </a:r>
             <a:r>
               <a:rPr u="sng">
-                <a:hlinkClick r:id="rId4" invalidUrl="" action="" tgtFrame="" tooltip="" history="1" highlightClick="0" endSnd="0"/>
+                <a:hlinkClick r:id="rId5" invalidUrl="" action="" tgtFrame="" tooltip="" history="1" highlightClick="0" endSnd="0"/>
               </a:rPr>
               <a:t>https://medium.com/@thewritingmonk</a:t>
             </a:r>
@@ -4791,7 +6018,7 @@
       </p:sp>
       <p:sp>
         <p:nvSpPr>
-          <p:cNvPr id="137" name="Shape 137"/>
+          <p:cNvPr id="139" name="Shape 139"/>
           <p:cNvSpPr/>
           <p:nvPr>
             <p:ph type="body" sz="quarter" idx="1"/>
@@ -4800,7 +6027,7 @@
         <p:spPr>
           <a:xfrm>
             <a:off x="508000" y="516526"/>
-            <a:ext cx="5829301" cy="838201"/>
+            <a:ext cx="5829300" cy="838201"/>
           </a:xfrm>
           <a:prstGeom prst="rect">
             <a:avLst/>
@@ -4830,14 +6057,14 @@
       </p:sp>
       <p:pic>
         <p:nvPicPr>
-          <p:cNvPr id="138" name="WhatsApp Image 2020-08-01 at 7.06.09 AM.jpeg"/>
+          <p:cNvPr id="140" name="WhatsApp Image 2020-08-01 at 7.06.09 AM.jpeg"/>
           <p:cNvPicPr>
             <a:picLocks noChangeAspect="1"/>
           </p:cNvPicPr>
           <p:nvPr/>
         </p:nvPicPr>
         <p:blipFill>
-          <a:blip r:embed="rId5">
+          <a:blip r:embed="rId6">
             <a:extLst/>
           </a:blip>
           <a:stretch>
@@ -4846,7 +6073,7 @@
         </p:blipFill>
         <p:spPr>
           <a:xfrm>
-            <a:off x="6711331" y="990600"/>
+            <a:off x="6711332" y="990600"/>
             <a:ext cx="6140265" cy="8187019"/>
           </a:xfrm>
           <a:prstGeom prst="rect">
@@ -4857,6 +6084,42 @@
           </a:ln>
         </p:spPr>
       </p:pic>
+      <p:sp>
+        <p:nvSpPr>
+          <p:cNvPr id="141" name="Shape 141"/>
+          <p:cNvSpPr/>
+          <p:nvPr/>
+        </p:nvSpPr>
+        <p:spPr>
+          <a:xfrm>
+            <a:off x="526488" y="1566363"/>
+            <a:ext cx="2142679" cy="622301"/>
+          </a:xfrm>
+          <a:prstGeom prst="rect">
+            <a:avLst/>
+          </a:prstGeom>
+          <a:ln w="12700">
+            <a:miter lim="400000"/>
+          </a:ln>
+          <a:extLst>
+            <a:ext uri="{C572A759-6A51-4108-AA02-DFA0A04FC94B}">
+              <ma14:wrappingTextBoxFlag xmlns:ma14="http://schemas.microsoft.com/office/mac/drawingml/2011/main" val="1"/>
+            </a:ext>
+          </a:extLst>
+        </p:spPr>
+        <p:txBody>
+          <a:bodyPr wrap="none" lIns="50800" tIns="50800" rIns="50800" bIns="50800" anchor="ctr">
+            <a:spAutoFit/>
+          </a:bodyPr>
+          <a:lstStyle/>
+          <a:p>
+            <a:pPr/>
+            <a:r>
+              <a:t>Deepankar</a:t>
+            </a:r>
+          </a:p>
+        </p:txBody>
+      </p:sp>
     </p:spTree>
   </p:cSld>
   <p:clrMapOvr>
@@ -4896,7 +6159,7 @@
       </p:grpSpPr>
       <p:grpSp>
         <p:nvGrpSpPr>
-          <p:cNvPr id="142" name="Group 142"/>
+          <p:cNvPr id="147" name="Group 147"/>
           <p:cNvGrpSpPr/>
           <p:nvPr/>
         </p:nvGrpSpPr>
@@ -4910,14 +6173,14 @@
         </p:grpSpPr>
         <p:pic>
           <p:nvPicPr>
-            <p:cNvPr id="141" name="Screen Shot 2020-08-01 at 6.48.31 AM.png"/>
+            <p:cNvPr id="146" name="Screen Shot 2020-08-01 at 6.48.31 AM.png"/>
             <p:cNvPicPr>
               <a:picLocks noChangeAspect="1"/>
             </p:cNvPicPr>
             <p:nvPr/>
           </p:nvPicPr>
           <p:blipFill>
-            <a:blip r:embed="rId2">
+            <a:blip r:embed="rId3">
               <a:extLst/>
             </a:blip>
             <a:stretch>
@@ -4940,14 +6203,14 @@
         </p:pic>
         <p:pic>
           <p:nvPicPr>
-            <p:cNvPr id="140" name=""/>
+            <p:cNvPr id="145" name=""/>
             <p:cNvPicPr>
               <a:picLocks noChangeAspect="0"/>
             </p:cNvPicPr>
             <p:nvPr/>
           </p:nvPicPr>
           <p:blipFill>
-            <a:blip r:embed="rId3">
+            <a:blip r:embed="rId4">
               <a:extLst/>
             </a:blip>
             <a:stretch>
@@ -4968,7 +6231,7 @@
       </p:grpSp>
       <p:sp>
         <p:nvSpPr>
-          <p:cNvPr id="143" name="Shape 143"/>
+          <p:cNvPr id="148" name="Shape 148"/>
           <p:cNvSpPr/>
           <p:nvPr>
             <p:ph type="title"/>
@@ -5011,14 +6274,14 @@
       </p:sp>
       <p:sp>
         <p:nvSpPr>
-          <p:cNvPr id="144" name="Shape 144"/>
+          <p:cNvPr id="149" name="Shape 149"/>
           <p:cNvSpPr/>
           <p:nvPr/>
         </p:nvSpPr>
         <p:spPr>
           <a:xfrm>
-            <a:off x="6041516" y="4565650"/>
-            <a:ext cx="921768" cy="622300"/>
+            <a:off x="6041516" y="4565649"/>
+            <a:ext cx="921768" cy="622301"/>
           </a:xfrm>
           <a:prstGeom prst="rect">
             <a:avLst/>
@@ -5039,7 +6302,7 @@
       </p:sp>
       <p:sp>
         <p:nvSpPr>
-          <p:cNvPr id="145" name="Shape 145"/>
+          <p:cNvPr id="150" name="Shape 150"/>
           <p:cNvSpPr/>
           <p:nvPr/>
         </p:nvSpPr>
@@ -5067,7 +6330,7 @@
           <a:lstStyle>
             <a:lvl1pPr algn="l">
               <a:defRPr sz="2200" u="sng">
-                <a:hlinkClick r:id="rId4" invalidUrl="" action="" tgtFrame="" tooltip="" history="1" highlightClick="0" endSnd="0"/>
+                <a:hlinkClick r:id="rId5" invalidUrl="" action="" tgtFrame="" tooltip="" history="1" highlightClick="0" endSnd="0"/>
               </a:defRPr>
             </a:lvl1pPr>
           </a:lstStyle>
@@ -5077,7 +6340,7 @@
             </a:pPr>
             <a:r>
               <a:rPr u="sng">
-                <a:hlinkClick r:id="rId4" invalidUrl="" action="" tgtFrame="" tooltip="" history="1" highlightClick="0" endSnd="0"/>
+                <a:hlinkClick r:id="rId5" invalidUrl="" action="" tgtFrame="" tooltip="" history="1" highlightClick="0" endSnd="0"/>
               </a:rPr>
               <a:t>https://trends.google.com/trends/explore?date=2009-05-26%202019-06-26&amp;q=microservices,monolith</a:t>
             </a:r>
@@ -5112,7 +6375,7 @@
       </p:grpSpPr>
       <p:sp>
         <p:nvSpPr>
-          <p:cNvPr id="147" name="Shape 147"/>
+          <p:cNvPr id="154" name="Shape 154"/>
           <p:cNvSpPr/>
           <p:nvPr/>
         </p:nvSpPr>
@@ -5148,7 +6411,7 @@
       </p:sp>
       <p:sp>
         <p:nvSpPr>
-          <p:cNvPr id="148" name="Shape 148"/>
+          <p:cNvPr id="155" name="Shape 155"/>
           <p:cNvSpPr/>
           <p:nvPr/>
         </p:nvSpPr>
@@ -5192,7 +6455,7 @@
       </p:sp>
       <p:sp>
         <p:nvSpPr>
-          <p:cNvPr id="149" name="Shape 149"/>
+          <p:cNvPr id="156" name="Shape 156"/>
           <p:cNvSpPr/>
           <p:nvPr/>
         </p:nvSpPr>
@@ -5267,7 +6530,7 @@
       </p:sp>
       <p:sp>
         <p:nvSpPr>
-          <p:cNvPr id="150" name="Shape 150"/>
+          <p:cNvPr id="157" name="Shape 157"/>
           <p:cNvSpPr/>
           <p:nvPr/>
         </p:nvSpPr>
@@ -5340,7 +6603,7 @@
       </p:grpSpPr>
       <p:sp>
         <p:nvSpPr>
-          <p:cNvPr id="152" name="Shape 152"/>
+          <p:cNvPr id="159" name="Shape 159"/>
           <p:cNvSpPr/>
           <p:nvPr/>
         </p:nvSpPr>
@@ -5384,7 +6647,7 @@
       </p:sp>
       <p:sp>
         <p:nvSpPr>
-          <p:cNvPr id="153" name="Shape 153"/>
+          <p:cNvPr id="160" name="Shape 160"/>
           <p:cNvSpPr/>
           <p:nvPr/>
         </p:nvSpPr>
@@ -5507,7 +6770,7 @@
       </p:grpSpPr>
       <p:sp>
         <p:nvSpPr>
-          <p:cNvPr id="155" name="Shape 155"/>
+          <p:cNvPr id="162" name="Shape 162"/>
           <p:cNvSpPr/>
           <p:nvPr/>
         </p:nvSpPr>
@@ -5551,7 +6814,7 @@
       </p:sp>
       <p:sp>
         <p:nvSpPr>
-          <p:cNvPr id="156" name="Shape 156"/>
+          <p:cNvPr id="163" name="Shape 163"/>
           <p:cNvSpPr/>
           <p:nvPr/>
         </p:nvSpPr>
@@ -5643,7 +6906,7 @@
       </p:grpSpPr>
       <p:sp>
         <p:nvSpPr>
-          <p:cNvPr id="158" name="Shape 158"/>
+          <p:cNvPr id="167" name="Shape 167"/>
           <p:cNvSpPr/>
           <p:nvPr/>
         </p:nvSpPr>
@@ -5687,14 +6950,14 @@
       </p:sp>
       <p:sp>
         <p:nvSpPr>
-          <p:cNvPr id="159" name="Shape 159"/>
+          <p:cNvPr id="168" name="Shape 168"/>
           <p:cNvSpPr/>
           <p:nvPr/>
         </p:nvSpPr>
         <p:spPr>
           <a:xfrm>
             <a:off x="1235382" y="3024080"/>
-            <a:ext cx="4184676" cy="2184401"/>
+            <a:ext cx="5548239" cy="2184401"/>
           </a:xfrm>
           <a:prstGeom prst="rect">
             <a:avLst/>
@@ -5746,7 +7009,7 @@
               <a:buChar char="•"/>
             </a:pPr>
             <a:r>
-              <a:t>Resiliency</a:t>
+              <a:t>Resiliency and observability </a:t>
             </a:r>
           </a:p>
         </p:txBody>
@@ -5779,7 +7042,7 @@
       </p:grpSpPr>
       <p:sp>
         <p:nvSpPr>
-          <p:cNvPr id="161" name="Shape 161"/>
+          <p:cNvPr id="170" name="Shape 170"/>
           <p:cNvSpPr/>
           <p:nvPr/>
         </p:nvSpPr>
@@ -5823,7 +7086,7 @@
       </p:sp>
       <p:sp>
         <p:nvSpPr>
-          <p:cNvPr id="162" name="Shape 162"/>
+          <p:cNvPr id="171" name="Shape 171"/>
           <p:cNvSpPr/>
           <p:nvPr/>
         </p:nvSpPr>
@@ -5906,7 +7169,7 @@
       </p:grpSpPr>
       <p:sp>
         <p:nvSpPr>
-          <p:cNvPr id="164" name="Shape 164"/>
+          <p:cNvPr id="175" name="Shape 175"/>
           <p:cNvSpPr/>
           <p:nvPr/>
         </p:nvSpPr>
@@ -5950,7 +7213,7 @@
       </p:sp>
       <p:sp>
         <p:nvSpPr>
-          <p:cNvPr id="165" name="Shape 165"/>
+          <p:cNvPr id="176" name="Shape 176"/>
           <p:cNvSpPr/>
           <p:nvPr/>
         </p:nvSpPr>

</xml_diff>